<commit_message>
response to reviews: added a map of top 4 departments by incidence and some examples of how medoid curves compared to fitted curves
</commit_message>
<xml_diff>
--- a/output/2_classification/Figure2.pptx
+++ b/output/2_classification/Figure2.pptx
@@ -165,7 +165,7 @@
           </a:lstStyle>
           <a:p>
             <a:r>
-              <a:rPr lang="en-US" smtClean="0"/>
+              <a:rPr lang="en-US"/>
               <a:t>Click to edit Master title style</a:t>
             </a:r>
             <a:endParaRPr lang="en-US" dirty="0"/>
@@ -230,7 +230,7 @@
           </a:lstStyle>
           <a:p>
             <a:r>
-              <a:rPr lang="en-US" smtClean="0"/>
+              <a:rPr lang="en-US"/>
               <a:t>Click to edit Master subtitle style</a:t>
             </a:r>
             <a:endParaRPr lang="en-US" dirty="0"/>
@@ -254,7 +254,7 @@
           <a:p>
             <a:fld id="{C929AC89-55C9-3641-B05F-AF9782681467}" type="datetimeFigureOut">
               <a:rPr lang="en-US" smtClean="0"/>
-              <a:t>4/13/18</a:t>
+              <a:t>6/23/19</a:t>
             </a:fld>
             <a:endParaRPr lang="en-US"/>
           </a:p>
@@ -343,7 +343,7 @@
           <a:lstStyle/>
           <a:p>
             <a:r>
-              <a:rPr lang="en-US" smtClean="0"/>
+              <a:rPr lang="en-US"/>
               <a:t>Click to edit Master title style</a:t>
             </a:r>
             <a:endParaRPr lang="en-US" dirty="0"/>
@@ -367,35 +367,35 @@
           <a:p>
             <a:pPr lvl="0"/>
             <a:r>
-              <a:rPr lang="en-US" smtClean="0"/>
+              <a:rPr lang="en-US"/>
               <a:t>Click to edit Master text styles</a:t>
             </a:r>
           </a:p>
           <a:p>
             <a:pPr lvl="1"/>
             <a:r>
-              <a:rPr lang="en-US" smtClean="0"/>
+              <a:rPr lang="en-US"/>
               <a:t>Second level</a:t>
             </a:r>
           </a:p>
           <a:p>
             <a:pPr lvl="2"/>
             <a:r>
-              <a:rPr lang="en-US" smtClean="0"/>
+              <a:rPr lang="en-US"/>
               <a:t>Third level</a:t>
             </a:r>
           </a:p>
           <a:p>
             <a:pPr lvl="3"/>
             <a:r>
-              <a:rPr lang="en-US" smtClean="0"/>
+              <a:rPr lang="en-US"/>
               <a:t>Fourth level</a:t>
             </a:r>
           </a:p>
           <a:p>
             <a:pPr lvl="4"/>
             <a:r>
-              <a:rPr lang="en-US" smtClean="0"/>
+              <a:rPr lang="en-US"/>
               <a:t>Fifth level</a:t>
             </a:r>
             <a:endParaRPr lang="en-US" dirty="0"/>
@@ -419,7 +419,7 @@
           <a:p>
             <a:fld id="{C929AC89-55C9-3641-B05F-AF9782681467}" type="datetimeFigureOut">
               <a:rPr lang="en-US" smtClean="0"/>
-              <a:t>4/13/18</a:t>
+              <a:t>6/23/19</a:t>
             </a:fld>
             <a:endParaRPr lang="en-US"/>
           </a:p>
@@ -513,7 +513,7 @@
           <a:lstStyle/>
           <a:p>
             <a:r>
-              <a:rPr lang="en-US" smtClean="0"/>
+              <a:rPr lang="en-US"/>
               <a:t>Click to edit Master title style</a:t>
             </a:r>
             <a:endParaRPr lang="en-US" dirty="0"/>
@@ -542,35 +542,35 @@
           <a:p>
             <a:pPr lvl="0"/>
             <a:r>
-              <a:rPr lang="en-US" smtClean="0"/>
+              <a:rPr lang="en-US"/>
               <a:t>Click to edit Master text styles</a:t>
             </a:r>
           </a:p>
           <a:p>
             <a:pPr lvl="1"/>
             <a:r>
-              <a:rPr lang="en-US" smtClean="0"/>
+              <a:rPr lang="en-US"/>
               <a:t>Second level</a:t>
             </a:r>
           </a:p>
           <a:p>
             <a:pPr lvl="2"/>
             <a:r>
-              <a:rPr lang="en-US" smtClean="0"/>
+              <a:rPr lang="en-US"/>
               <a:t>Third level</a:t>
             </a:r>
           </a:p>
           <a:p>
             <a:pPr lvl="3"/>
             <a:r>
-              <a:rPr lang="en-US" smtClean="0"/>
+              <a:rPr lang="en-US"/>
               <a:t>Fourth level</a:t>
             </a:r>
           </a:p>
           <a:p>
             <a:pPr lvl="4"/>
             <a:r>
-              <a:rPr lang="en-US" smtClean="0"/>
+              <a:rPr lang="en-US"/>
               <a:t>Fifth level</a:t>
             </a:r>
             <a:endParaRPr lang="en-US" dirty="0"/>
@@ -594,7 +594,7 @@
           <a:p>
             <a:fld id="{C929AC89-55C9-3641-B05F-AF9782681467}" type="datetimeFigureOut">
               <a:rPr lang="en-US" smtClean="0"/>
-              <a:t>4/13/18</a:t>
+              <a:t>6/23/19</a:t>
             </a:fld>
             <a:endParaRPr lang="en-US"/>
           </a:p>
@@ -683,7 +683,7 @@
           <a:lstStyle/>
           <a:p>
             <a:r>
-              <a:rPr lang="en-US" smtClean="0"/>
+              <a:rPr lang="en-US"/>
               <a:t>Click to edit Master title style</a:t>
             </a:r>
             <a:endParaRPr lang="en-US" dirty="0"/>
@@ -707,35 +707,35 @@
           <a:p>
             <a:pPr lvl="0"/>
             <a:r>
-              <a:rPr lang="en-US" smtClean="0"/>
+              <a:rPr lang="en-US"/>
               <a:t>Click to edit Master text styles</a:t>
             </a:r>
           </a:p>
           <a:p>
             <a:pPr lvl="1"/>
             <a:r>
-              <a:rPr lang="en-US" smtClean="0"/>
+              <a:rPr lang="en-US"/>
               <a:t>Second level</a:t>
             </a:r>
           </a:p>
           <a:p>
             <a:pPr lvl="2"/>
             <a:r>
-              <a:rPr lang="en-US" smtClean="0"/>
+              <a:rPr lang="en-US"/>
               <a:t>Third level</a:t>
             </a:r>
           </a:p>
           <a:p>
             <a:pPr lvl="3"/>
             <a:r>
-              <a:rPr lang="en-US" smtClean="0"/>
+              <a:rPr lang="en-US"/>
               <a:t>Fourth level</a:t>
             </a:r>
           </a:p>
           <a:p>
             <a:pPr lvl="4"/>
             <a:r>
-              <a:rPr lang="en-US" smtClean="0"/>
+              <a:rPr lang="en-US"/>
               <a:t>Fifth level</a:t>
             </a:r>
             <a:endParaRPr lang="en-US" dirty="0"/>
@@ -759,7 +759,7 @@
           <a:p>
             <a:fld id="{C929AC89-55C9-3641-B05F-AF9782681467}" type="datetimeFigureOut">
               <a:rPr lang="en-US" smtClean="0"/>
-              <a:t>4/13/18</a:t>
+              <a:t>6/23/19</a:t>
             </a:fld>
             <a:endParaRPr lang="en-US"/>
           </a:p>
@@ -857,7 +857,7 @@
           </a:lstStyle>
           <a:p>
             <a:r>
-              <a:rPr lang="en-US" smtClean="0"/>
+              <a:rPr lang="en-US"/>
               <a:t>Click to edit Master title style</a:t>
             </a:r>
             <a:endParaRPr lang="en-US" dirty="0"/>
@@ -975,7 +975,7 @@
           <a:p>
             <a:pPr lvl="0"/>
             <a:r>
-              <a:rPr lang="en-US" smtClean="0"/>
+              <a:rPr lang="en-US"/>
               <a:t>Click to edit Master text styles</a:t>
             </a:r>
           </a:p>
@@ -998,7 +998,7 @@
           <a:p>
             <a:fld id="{C929AC89-55C9-3641-B05F-AF9782681467}" type="datetimeFigureOut">
               <a:rPr lang="en-US" smtClean="0"/>
-              <a:t>4/13/18</a:t>
+              <a:t>6/23/19</a:t>
             </a:fld>
             <a:endParaRPr lang="en-US"/>
           </a:p>
@@ -1087,7 +1087,7 @@
           <a:lstStyle/>
           <a:p>
             <a:r>
-              <a:rPr lang="en-US" smtClean="0"/>
+              <a:rPr lang="en-US"/>
               <a:t>Click to edit Master title style</a:t>
             </a:r>
             <a:endParaRPr lang="en-US" dirty="0"/>
@@ -1116,35 +1116,35 @@
           <a:p>
             <a:pPr lvl="0"/>
             <a:r>
-              <a:rPr lang="en-US" smtClean="0"/>
+              <a:rPr lang="en-US"/>
               <a:t>Click to edit Master text styles</a:t>
             </a:r>
           </a:p>
           <a:p>
             <a:pPr lvl="1"/>
             <a:r>
-              <a:rPr lang="en-US" smtClean="0"/>
+              <a:rPr lang="en-US"/>
               <a:t>Second level</a:t>
             </a:r>
           </a:p>
           <a:p>
             <a:pPr lvl="2"/>
             <a:r>
-              <a:rPr lang="en-US" smtClean="0"/>
+              <a:rPr lang="en-US"/>
               <a:t>Third level</a:t>
             </a:r>
           </a:p>
           <a:p>
             <a:pPr lvl="3"/>
             <a:r>
-              <a:rPr lang="en-US" smtClean="0"/>
+              <a:rPr lang="en-US"/>
               <a:t>Fourth level</a:t>
             </a:r>
           </a:p>
           <a:p>
             <a:pPr lvl="4"/>
             <a:r>
-              <a:rPr lang="en-US" smtClean="0"/>
+              <a:rPr lang="en-US"/>
               <a:t>Fifth level</a:t>
             </a:r>
             <a:endParaRPr lang="en-US" dirty="0"/>
@@ -1173,35 +1173,35 @@
           <a:p>
             <a:pPr lvl="0"/>
             <a:r>
-              <a:rPr lang="en-US" smtClean="0"/>
+              <a:rPr lang="en-US"/>
               <a:t>Click to edit Master text styles</a:t>
             </a:r>
           </a:p>
           <a:p>
             <a:pPr lvl="1"/>
             <a:r>
-              <a:rPr lang="en-US" smtClean="0"/>
+              <a:rPr lang="en-US"/>
               <a:t>Second level</a:t>
             </a:r>
           </a:p>
           <a:p>
             <a:pPr lvl="2"/>
             <a:r>
-              <a:rPr lang="en-US" smtClean="0"/>
+              <a:rPr lang="en-US"/>
               <a:t>Third level</a:t>
             </a:r>
           </a:p>
           <a:p>
             <a:pPr lvl="3"/>
             <a:r>
-              <a:rPr lang="en-US" smtClean="0"/>
+              <a:rPr lang="en-US"/>
               <a:t>Fourth level</a:t>
             </a:r>
           </a:p>
           <a:p>
             <a:pPr lvl="4"/>
             <a:r>
-              <a:rPr lang="en-US" smtClean="0"/>
+              <a:rPr lang="en-US"/>
               <a:t>Fifth level</a:t>
             </a:r>
             <a:endParaRPr lang="en-US" dirty="0"/>
@@ -1225,7 +1225,7 @@
           <a:p>
             <a:fld id="{C929AC89-55C9-3641-B05F-AF9782681467}" type="datetimeFigureOut">
               <a:rPr lang="en-US" smtClean="0"/>
-              <a:t>4/13/18</a:t>
+              <a:t>6/23/19</a:t>
             </a:fld>
             <a:endParaRPr lang="en-US"/>
           </a:p>
@@ -1319,7 +1319,7 @@
           <a:lstStyle/>
           <a:p>
             <a:r>
-              <a:rPr lang="en-US" smtClean="0"/>
+              <a:rPr lang="en-US"/>
               <a:t>Click to edit Master title style</a:t>
             </a:r>
             <a:endParaRPr lang="en-US" dirty="0"/>
@@ -1385,7 +1385,7 @@
           <a:p>
             <a:pPr lvl="0"/>
             <a:r>
-              <a:rPr lang="en-US" smtClean="0"/>
+              <a:rPr lang="en-US"/>
               <a:t>Click to edit Master text styles</a:t>
             </a:r>
           </a:p>
@@ -1413,35 +1413,35 @@
           <a:p>
             <a:pPr lvl="0"/>
             <a:r>
-              <a:rPr lang="en-US" smtClean="0"/>
+              <a:rPr lang="en-US"/>
               <a:t>Click to edit Master text styles</a:t>
             </a:r>
           </a:p>
           <a:p>
             <a:pPr lvl="1"/>
             <a:r>
-              <a:rPr lang="en-US" smtClean="0"/>
+              <a:rPr lang="en-US"/>
               <a:t>Second level</a:t>
             </a:r>
           </a:p>
           <a:p>
             <a:pPr lvl="2"/>
             <a:r>
-              <a:rPr lang="en-US" smtClean="0"/>
+              <a:rPr lang="en-US"/>
               <a:t>Third level</a:t>
             </a:r>
           </a:p>
           <a:p>
             <a:pPr lvl="3"/>
             <a:r>
-              <a:rPr lang="en-US" smtClean="0"/>
+              <a:rPr lang="en-US"/>
               <a:t>Fourth level</a:t>
             </a:r>
           </a:p>
           <a:p>
             <a:pPr lvl="4"/>
             <a:r>
-              <a:rPr lang="en-US" smtClean="0"/>
+              <a:rPr lang="en-US"/>
               <a:t>Fifth level</a:t>
             </a:r>
             <a:endParaRPr lang="en-US" dirty="0"/>
@@ -1507,7 +1507,7 @@
           <a:p>
             <a:pPr lvl="0"/>
             <a:r>
-              <a:rPr lang="en-US" smtClean="0"/>
+              <a:rPr lang="en-US"/>
               <a:t>Click to edit Master text styles</a:t>
             </a:r>
           </a:p>
@@ -1535,35 +1535,35 @@
           <a:p>
             <a:pPr lvl="0"/>
             <a:r>
-              <a:rPr lang="en-US" smtClean="0"/>
+              <a:rPr lang="en-US"/>
               <a:t>Click to edit Master text styles</a:t>
             </a:r>
           </a:p>
           <a:p>
             <a:pPr lvl="1"/>
             <a:r>
-              <a:rPr lang="en-US" smtClean="0"/>
+              <a:rPr lang="en-US"/>
               <a:t>Second level</a:t>
             </a:r>
           </a:p>
           <a:p>
             <a:pPr lvl="2"/>
             <a:r>
-              <a:rPr lang="en-US" smtClean="0"/>
+              <a:rPr lang="en-US"/>
               <a:t>Third level</a:t>
             </a:r>
           </a:p>
           <a:p>
             <a:pPr lvl="3"/>
             <a:r>
-              <a:rPr lang="en-US" smtClean="0"/>
+              <a:rPr lang="en-US"/>
               <a:t>Fourth level</a:t>
             </a:r>
           </a:p>
           <a:p>
             <a:pPr lvl="4"/>
             <a:r>
-              <a:rPr lang="en-US" smtClean="0"/>
+              <a:rPr lang="en-US"/>
               <a:t>Fifth level</a:t>
             </a:r>
             <a:endParaRPr lang="en-US" dirty="0"/>
@@ -1587,7 +1587,7 @@
           <a:p>
             <a:fld id="{C929AC89-55C9-3641-B05F-AF9782681467}" type="datetimeFigureOut">
               <a:rPr lang="en-US" smtClean="0"/>
-              <a:t>4/13/18</a:t>
+              <a:t>6/23/19</a:t>
             </a:fld>
             <a:endParaRPr lang="en-US"/>
           </a:p>
@@ -1676,7 +1676,7 @@
           <a:lstStyle/>
           <a:p>
             <a:r>
-              <a:rPr lang="en-US" smtClean="0"/>
+              <a:rPr lang="en-US"/>
               <a:t>Click to edit Master title style</a:t>
             </a:r>
             <a:endParaRPr lang="en-US" dirty="0"/>
@@ -1700,7 +1700,7 @@
           <a:p>
             <a:fld id="{C929AC89-55C9-3641-B05F-AF9782681467}" type="datetimeFigureOut">
               <a:rPr lang="en-US" smtClean="0"/>
-              <a:t>4/13/18</a:t>
+              <a:t>6/23/19</a:t>
             </a:fld>
             <a:endParaRPr lang="en-US"/>
           </a:p>
@@ -1790,7 +1790,7 @@
           <a:p>
             <a:fld id="{C929AC89-55C9-3641-B05F-AF9782681467}" type="datetimeFigureOut">
               <a:rPr lang="en-US" smtClean="0"/>
-              <a:t>4/13/18</a:t>
+              <a:t>6/23/19</a:t>
             </a:fld>
             <a:endParaRPr lang="en-US"/>
           </a:p>
@@ -1888,7 +1888,7 @@
           </a:lstStyle>
           <a:p>
             <a:r>
-              <a:rPr lang="en-US" smtClean="0"/>
+              <a:rPr lang="en-US"/>
               <a:t>Click to edit Master title style</a:t>
             </a:r>
             <a:endParaRPr lang="en-US" dirty="0"/>
@@ -1945,35 +1945,35 @@
           <a:p>
             <a:pPr lvl="0"/>
             <a:r>
-              <a:rPr lang="en-US" smtClean="0"/>
+              <a:rPr lang="en-US"/>
               <a:t>Click to edit Master text styles</a:t>
             </a:r>
           </a:p>
           <a:p>
             <a:pPr lvl="1"/>
             <a:r>
-              <a:rPr lang="en-US" smtClean="0"/>
+              <a:rPr lang="en-US"/>
               <a:t>Second level</a:t>
             </a:r>
           </a:p>
           <a:p>
             <a:pPr lvl="2"/>
             <a:r>
-              <a:rPr lang="en-US" smtClean="0"/>
+              <a:rPr lang="en-US"/>
               <a:t>Third level</a:t>
             </a:r>
           </a:p>
           <a:p>
             <a:pPr lvl="3"/>
             <a:r>
-              <a:rPr lang="en-US" smtClean="0"/>
+              <a:rPr lang="en-US"/>
               <a:t>Fourth level</a:t>
             </a:r>
           </a:p>
           <a:p>
             <a:pPr lvl="4"/>
             <a:r>
-              <a:rPr lang="en-US" smtClean="0"/>
+              <a:rPr lang="en-US"/>
               <a:t>Fifth level</a:t>
             </a:r>
             <a:endParaRPr lang="en-US" dirty="0"/>
@@ -2039,7 +2039,7 @@
           <a:p>
             <a:pPr lvl="0"/>
             <a:r>
-              <a:rPr lang="en-US" smtClean="0"/>
+              <a:rPr lang="en-US"/>
               <a:t>Click to edit Master text styles</a:t>
             </a:r>
           </a:p>
@@ -2062,7 +2062,7 @@
           <a:p>
             <a:fld id="{C929AC89-55C9-3641-B05F-AF9782681467}" type="datetimeFigureOut">
               <a:rPr lang="en-US" smtClean="0"/>
-              <a:t>4/13/18</a:t>
+              <a:t>6/23/19</a:t>
             </a:fld>
             <a:endParaRPr lang="en-US"/>
           </a:p>
@@ -2160,7 +2160,7 @@
           </a:lstStyle>
           <a:p>
             <a:r>
-              <a:rPr lang="en-US" smtClean="0"/>
+              <a:rPr lang="en-US"/>
               <a:t>Click to edit Master title style</a:t>
             </a:r>
             <a:endParaRPr lang="en-US" dirty="0"/>
@@ -2225,7 +2225,7 @@
           </a:lstStyle>
           <a:p>
             <a:r>
-              <a:rPr lang="en-US" smtClean="0"/>
+              <a:rPr lang="en-US"/>
               <a:t>Drag picture to placeholder or click icon to add</a:t>
             </a:r>
             <a:endParaRPr lang="en-US" dirty="0"/>
@@ -2291,7 +2291,7 @@
           <a:p>
             <a:pPr lvl="0"/>
             <a:r>
-              <a:rPr lang="en-US" smtClean="0"/>
+              <a:rPr lang="en-US"/>
               <a:t>Click to edit Master text styles</a:t>
             </a:r>
           </a:p>
@@ -2314,7 +2314,7 @@
           <a:p>
             <a:fld id="{C929AC89-55C9-3641-B05F-AF9782681467}" type="datetimeFigureOut">
               <a:rPr lang="en-US" smtClean="0"/>
-              <a:t>4/13/18</a:t>
+              <a:t>6/23/19</a:t>
             </a:fld>
             <a:endParaRPr lang="en-US"/>
           </a:p>
@@ -2418,7 +2418,7 @@
           <a:lstStyle/>
           <a:p>
             <a:r>
-              <a:rPr lang="en-US" smtClean="0"/>
+              <a:rPr lang="en-US"/>
               <a:t>Click to edit Master title style</a:t>
             </a:r>
             <a:endParaRPr lang="en-US" dirty="0"/>
@@ -2452,35 +2452,35 @@
           <a:p>
             <a:pPr lvl="0"/>
             <a:r>
-              <a:rPr lang="en-US" smtClean="0"/>
+              <a:rPr lang="en-US"/>
               <a:t>Click to edit Master text styles</a:t>
             </a:r>
           </a:p>
           <a:p>
             <a:pPr lvl="1"/>
             <a:r>
-              <a:rPr lang="en-US" smtClean="0"/>
+              <a:rPr lang="en-US"/>
               <a:t>Second level</a:t>
             </a:r>
           </a:p>
           <a:p>
             <a:pPr lvl="2"/>
             <a:r>
-              <a:rPr lang="en-US" smtClean="0"/>
+              <a:rPr lang="en-US"/>
               <a:t>Third level</a:t>
             </a:r>
           </a:p>
           <a:p>
             <a:pPr lvl="3"/>
             <a:r>
-              <a:rPr lang="en-US" smtClean="0"/>
+              <a:rPr lang="en-US"/>
               <a:t>Fourth level</a:t>
             </a:r>
           </a:p>
           <a:p>
             <a:pPr lvl="4"/>
             <a:r>
-              <a:rPr lang="en-US" smtClean="0"/>
+              <a:rPr lang="en-US"/>
               <a:t>Fifth level</a:t>
             </a:r>
             <a:endParaRPr lang="en-US" dirty="0"/>
@@ -2522,7 +2522,7 @@
           <a:p>
             <a:fld id="{C929AC89-55C9-3641-B05F-AF9782681467}" type="datetimeFigureOut">
               <a:rPr lang="en-US" smtClean="0"/>
-              <a:t>4/13/18</a:t>
+              <a:t>6/23/19</a:t>
             </a:fld>
             <a:endParaRPr lang="en-US"/>
           </a:p>
@@ -3009,65 +3009,6 @@
           </a:p>
         </p:txBody>
       </p:sp>
-      <p:pic>
-        <p:nvPicPr>
-          <p:cNvPr id="4" name="Picture 3"/>
-          <p:cNvPicPr>
-            <a:picLocks noChangeAspect="1"/>
-          </p:cNvPicPr>
-          <p:nvPr/>
-        </p:nvPicPr>
-        <p:blipFill rotWithShape="1">
-          <a:blip r:embed="rId3">
-            <a:extLst>
-              <a:ext uri="{28A0092B-C50C-407E-A947-70E740481C1C}">
-                <a14:useLocalDpi xmlns:a14="http://schemas.microsoft.com/office/drawing/2010/main" val="0"/>
-              </a:ext>
-            </a:extLst>
-          </a:blip>
-          <a:srcRect l="4615" t="6975" r="3078" b="10166"/>
-          <a:stretch/>
-        </p:blipFill>
-        <p:spPr>
-          <a:xfrm>
-            <a:off x="143885" y="211975"/>
-            <a:ext cx="3912277" cy="1890934"/>
-          </a:xfrm>
-          <a:prstGeom prst="rect">
-            <a:avLst/>
-          </a:prstGeom>
-        </p:spPr>
-      </p:pic>
-      <p:pic>
-        <p:nvPicPr>
-          <p:cNvPr id="5" name="Picture 4"/>
-          <p:cNvPicPr>
-            <a:picLocks noChangeAspect="1"/>
-          </p:cNvPicPr>
-          <p:nvPr/>
-        </p:nvPicPr>
-        <p:blipFill>
-          <a:blip r:embed="rId2">
-            <a:extLst>
-              <a:ext uri="{28A0092B-C50C-407E-A947-70E740481C1C}">
-                <a14:useLocalDpi xmlns:a14="http://schemas.microsoft.com/office/drawing/2010/main" val="0"/>
-              </a:ext>
-            </a:extLst>
-          </a:blip>
-          <a:stretch>
-            <a:fillRect/>
-          </a:stretch>
-        </p:blipFill>
-        <p:spPr>
-          <a:xfrm>
-            <a:off x="-8792" y="2233810"/>
-            <a:ext cx="5943600" cy="2286000"/>
-          </a:xfrm>
-          <a:prstGeom prst="rect">
-            <a:avLst/>
-          </a:prstGeom>
-        </p:spPr>
-      </p:pic>
       <p:sp>
         <p:nvSpPr>
           <p:cNvPr id="8" name="Rectangle 7"/>
@@ -3154,6 +3095,65 @@
           </a:p>
         </p:txBody>
       </p:sp>
+      <p:pic>
+        <p:nvPicPr>
+          <p:cNvPr id="3" name="Picture 2">
+            <a:extLst>
+              <a:ext uri="{FF2B5EF4-FFF2-40B4-BE49-F238E27FC236}">
+                <a16:creationId xmlns:a16="http://schemas.microsoft.com/office/drawing/2014/main" id="{0D96381F-B51B-7E45-A03A-B4A01BA65E65}"/>
+              </a:ext>
+            </a:extLst>
+          </p:cNvPr>
+          <p:cNvPicPr>
+            <a:picLocks noChangeAspect="1"/>
+          </p:cNvPicPr>
+          <p:nvPr/>
+        </p:nvPicPr>
+        <p:blipFill rotWithShape="1">
+          <a:blip r:embed="rId3"/>
+          <a:srcRect l="4244" t="7333" r="4109" b="10057"/>
+          <a:stretch/>
+        </p:blipFill>
+        <p:spPr>
+          <a:xfrm>
+            <a:off x="148820" y="252875"/>
+            <a:ext cx="3851762" cy="1925881"/>
+          </a:xfrm>
+          <a:prstGeom prst="rect">
+            <a:avLst/>
+          </a:prstGeom>
+        </p:spPr>
+      </p:pic>
+      <p:pic>
+        <p:nvPicPr>
+          <p:cNvPr id="12" name="Picture 11">
+            <a:extLst>
+              <a:ext uri="{FF2B5EF4-FFF2-40B4-BE49-F238E27FC236}">
+                <a16:creationId xmlns:a16="http://schemas.microsoft.com/office/drawing/2014/main" id="{EC8DC00F-6A9A-484A-BD7C-8B2C57EDBE0F}"/>
+              </a:ext>
+            </a:extLst>
+          </p:cNvPr>
+          <p:cNvPicPr>
+            <a:picLocks noChangeAspect="1"/>
+          </p:cNvPicPr>
+          <p:nvPr/>
+        </p:nvPicPr>
+        <p:blipFill>
+          <a:blip r:embed="rId4"/>
+          <a:stretch>
+            <a:fillRect/>
+          </a:stretch>
+        </p:blipFill>
+        <p:spPr>
+          <a:xfrm>
+            <a:off x="-4609" y="2230878"/>
+            <a:ext cx="5969510" cy="2295965"/>
+          </a:xfrm>
+          <a:prstGeom prst="rect">
+            <a:avLst/>
+          </a:prstGeom>
+        </p:spPr>
+      </p:pic>
       <p:sp>
         <p:nvSpPr>
           <p:cNvPr id="10" name="TextBox 9"/>

</xml_diff>